<commit_message>
Fix background and titles
</commit_message>
<xml_diff>
--- a/session_five/session_five_presentation.pptx
+++ b/session_five/session_five_presentation.pptx
@@ -176,8 +176,8 @@
 <p1510:revInfo xmlns:a="http://schemas.openxmlformats.org/drawingml/2006/main" xmlns:r="http://schemas.openxmlformats.org/officeDocument/2006/relationships" xmlns:p1510="http://schemas.microsoft.com/office/powerpoint/2015/10/main">
   <p1510:revLst>
     <p1510:client id="{2BB45DB9-A5C7-42D9-8D86-58E9C0F106AD}" v="4" dt="2020-03-26T12:03:13.542"/>
+    <p1510:client id="{9769029B-DAE8-4543-A14E-8C5695AE6F3B}" v="252" dt="2020-03-26T09:57:15.391"/>
     <p1510:client id="{FEAF9D15-8916-46E4-AA42-74602A5A02FF}" v="129" dt="2020-03-26T11:53:18.451"/>
-    <p1510:client id="{9769029B-DAE8-4543-A14E-8C5695AE6F3B}" v="252" dt="2020-03-26T09:57:15.391"/>
   </p1510:revLst>
 </p1510:revInfo>
 </file>
@@ -26695,7 +26695,7 @@
 </file>
 
 <file path=ppt/slides/slide1.xml><?xml version="1.0" encoding="utf-8"?>
-<p:sld xmlns:a="http://schemas.openxmlformats.org/drawingml/2006/main" xmlns:r="http://schemas.openxmlformats.org/officeDocument/2006/relationships" xmlns:p="http://schemas.openxmlformats.org/presentationml/2006/main" showMasterSp="0">
+<p:sld xmlns:a="http://schemas.openxmlformats.org/drawingml/2006/main" xmlns:r="http://schemas.openxmlformats.org/officeDocument/2006/relationships" xmlns:p="http://schemas.openxmlformats.org/presentationml/2006/main">
   <p:cSld>
     <p:spTree>
       <p:nvGrpSpPr>
@@ -35295,11 +35295,7 @@
 
 <file path=customXml/item1.xml><?xml version="1.0" encoding="utf-8"?>
 <?mso-contentType ?>
-<FormTemplates xmlns="http://schemas.microsoft.com/sharepoint/v3/contenttype/forms">
-  <Display>DocumentLibraryForm</Display>
-  <Edit>DocumentLibraryForm</Edit>
-  <New>DocumentLibraryForm</New>
-</FormTemplates>
+<SharedContentType xmlns="Microsoft.SharePoint.Taxonomy.ContentTypeSync" SourceId="1ee89e71-04cd-405e-9ca3-99e020c1694d" ContentTypeId="0x0101" PreviousValue="false"/>
 </file>
 
 <file path=customXml/item2.xml><?xml version="1.0" encoding="utf-8"?>
@@ -35313,7 +35309,11 @@
 
 <file path=customXml/item3.xml><?xml version="1.0" encoding="utf-8"?>
 <?mso-contentType ?>
-<SharedContentType xmlns="Microsoft.SharePoint.Taxonomy.ContentTypeSync" SourceId="1ee89e71-04cd-405e-9ca3-99e020c1694d" ContentTypeId="0x0101" PreviousValue="false"/>
+<FormTemplates xmlns="http://schemas.microsoft.com/sharepoint/v3/contenttype/forms">
+  <Display>DocumentLibraryForm</Display>
+  <Edit>DocumentLibraryForm</Edit>
+  <New>DocumentLibraryForm</New>
+</FormTemplates>
 </file>
 
 <file path=customXml/item4.xml><?xml version="1.0" encoding="utf-8"?>
@@ -35496,9 +35496,9 @@
 </file>
 
 <file path=customXml/itemProps1.xml><?xml version="1.0" encoding="utf-8"?>
-<ds:datastoreItem xmlns:ds="http://schemas.openxmlformats.org/officeDocument/2006/customXml" ds:itemID="{BEBDFA33-3959-412D-BF65-F572B77FF4EC}">
+<ds:datastoreItem xmlns:ds="http://schemas.openxmlformats.org/officeDocument/2006/customXml" ds:itemID="{91989A13-6EBC-4BFF-A25C-E4D3CAAA08AF}">
   <ds:schemaRefs>
-    <ds:schemaRef ds:uri="http://schemas.microsoft.com/sharepoint/v3/contenttype/forms"/>
+    <ds:schemaRef ds:uri="Microsoft.SharePoint.Taxonomy.ContentTypeSync"/>
   </ds:schemaRefs>
 </ds:datastoreItem>
 </file>
@@ -35521,9 +35521,9 @@
 </file>
 
 <file path=customXml/itemProps3.xml><?xml version="1.0" encoding="utf-8"?>
-<ds:datastoreItem xmlns:ds="http://schemas.openxmlformats.org/officeDocument/2006/customXml" ds:itemID="{91989A13-6EBC-4BFF-A25C-E4D3CAAA08AF}">
+<ds:datastoreItem xmlns:ds="http://schemas.openxmlformats.org/officeDocument/2006/customXml" ds:itemID="{BEBDFA33-3959-412D-BF65-F572B77FF4EC}">
   <ds:schemaRefs>
-    <ds:schemaRef ds:uri="Microsoft.SharePoint.Taxonomy.ContentTypeSync"/>
+    <ds:schemaRef ds:uri="http://schemas.microsoft.com/sharepoint/v3/contenttype/forms"/>
   </ds:schemaRefs>
 </ds:datastoreItem>
 </file>

</xml_diff>